<commit_message>
add presentation 12.6 and mean transport
</commit_message>
<xml_diff>
--- a/Paper/figures/example_rotation_2_subj/fis.pptx
+++ b/Paper/figures/example_rotation_2_subj/fis.pptx
@@ -6,8 +6,15 @@
   </p:sldMasterIdLst>
   <p:sldIdLst>
     <p:sldId id="257" r:id="rId2"/>
-    <p:sldId id="258" r:id="rId3"/>
-    <p:sldId id="259" r:id="rId4"/>
+    <p:sldId id="260" r:id="rId3"/>
+    <p:sldId id="258" r:id="rId4"/>
+    <p:sldId id="259" r:id="rId5"/>
+    <p:sldId id="261" r:id="rId6"/>
+    <p:sldId id="262" r:id="rId7"/>
+    <p:sldId id="263" r:id="rId8"/>
+    <p:sldId id="264" r:id="rId9"/>
+    <p:sldId id="265" r:id="rId10"/>
+    <p:sldId id="266" r:id="rId11"/>
   </p:sldIdLst>
   <p:sldSz cx="11161713" cy="6858000"/>
   <p:notesSz cx="6858000" cy="9144000"/>
@@ -290,7 +297,7 @@
           <a:p>
             <a:fld id="{8863EACE-5EFD-4C06-816F-033332C7E367}" type="datetimeFigureOut">
               <a:rPr lang="he-IL" smtClean="0"/>
-              <a:t>כ"א/סיון/תשע"ח</a:t>
+              <a:t>כ"ו/סיון/תשע"ח</a:t>
             </a:fld>
             <a:endParaRPr lang="he-IL"/>
           </a:p>
@@ -460,7 +467,7 @@
           <a:p>
             <a:fld id="{8863EACE-5EFD-4C06-816F-033332C7E367}" type="datetimeFigureOut">
               <a:rPr lang="he-IL" smtClean="0"/>
-              <a:t>כ"א/סיון/תשע"ח</a:t>
+              <a:t>כ"ו/סיון/תשע"ח</a:t>
             </a:fld>
             <a:endParaRPr lang="he-IL"/>
           </a:p>
@@ -640,7 +647,7 @@
           <a:p>
             <a:fld id="{8863EACE-5EFD-4C06-816F-033332C7E367}" type="datetimeFigureOut">
               <a:rPr lang="he-IL" smtClean="0"/>
-              <a:t>כ"א/סיון/תשע"ח</a:t>
+              <a:t>כ"ו/סיון/תשע"ח</a:t>
             </a:fld>
             <a:endParaRPr lang="he-IL"/>
           </a:p>
@@ -810,7 +817,7 @@
           <a:p>
             <a:fld id="{8863EACE-5EFD-4C06-816F-033332C7E367}" type="datetimeFigureOut">
               <a:rPr lang="he-IL" smtClean="0"/>
-              <a:t>כ"א/סיון/תשע"ח</a:t>
+              <a:t>כ"ו/סיון/תשע"ח</a:t>
             </a:fld>
             <a:endParaRPr lang="he-IL"/>
           </a:p>
@@ -1056,7 +1063,7 @@
           <a:p>
             <a:fld id="{8863EACE-5EFD-4C06-816F-033332C7E367}" type="datetimeFigureOut">
               <a:rPr lang="he-IL" smtClean="0"/>
-              <a:t>כ"א/סיון/תשע"ח</a:t>
+              <a:t>כ"ו/סיון/תשע"ח</a:t>
             </a:fld>
             <a:endParaRPr lang="he-IL"/>
           </a:p>
@@ -1344,7 +1351,7 @@
           <a:p>
             <a:fld id="{8863EACE-5EFD-4C06-816F-033332C7E367}" type="datetimeFigureOut">
               <a:rPr lang="he-IL" smtClean="0"/>
-              <a:t>כ"א/סיון/תשע"ח</a:t>
+              <a:t>כ"ו/סיון/תשע"ח</a:t>
             </a:fld>
             <a:endParaRPr lang="he-IL"/>
           </a:p>
@@ -1771,7 +1778,7 @@
           <a:p>
             <a:fld id="{8863EACE-5EFD-4C06-816F-033332C7E367}" type="datetimeFigureOut">
               <a:rPr lang="he-IL" smtClean="0"/>
-              <a:t>כ"א/סיון/תשע"ח</a:t>
+              <a:t>כ"ו/סיון/תשע"ח</a:t>
             </a:fld>
             <a:endParaRPr lang="he-IL"/>
           </a:p>
@@ -1889,7 +1896,7 @@
           <a:p>
             <a:fld id="{8863EACE-5EFD-4C06-816F-033332C7E367}" type="datetimeFigureOut">
               <a:rPr lang="he-IL" smtClean="0"/>
-              <a:t>כ"א/סיון/תשע"ח</a:t>
+              <a:t>כ"ו/סיון/תשע"ח</a:t>
             </a:fld>
             <a:endParaRPr lang="he-IL"/>
           </a:p>
@@ -1984,7 +1991,7 @@
           <a:p>
             <a:fld id="{8863EACE-5EFD-4C06-816F-033332C7E367}" type="datetimeFigureOut">
               <a:rPr lang="he-IL" smtClean="0"/>
-              <a:t>כ"א/סיון/תשע"ח</a:t>
+              <a:t>כ"ו/סיון/תשע"ח</a:t>
             </a:fld>
             <a:endParaRPr lang="he-IL"/>
           </a:p>
@@ -2261,7 +2268,7 @@
           <a:p>
             <a:fld id="{8863EACE-5EFD-4C06-816F-033332C7E367}" type="datetimeFigureOut">
               <a:rPr lang="he-IL" smtClean="0"/>
-              <a:t>כ"א/סיון/תשע"ח</a:t>
+              <a:t>כ"ו/סיון/תשע"ח</a:t>
             </a:fld>
             <a:endParaRPr lang="he-IL"/>
           </a:p>
@@ -2514,7 +2521,7 @@
           <a:p>
             <a:fld id="{8863EACE-5EFD-4C06-816F-033332C7E367}" type="datetimeFigureOut">
               <a:rPr lang="he-IL" smtClean="0"/>
-              <a:t>כ"א/סיון/תשע"ח</a:t>
+              <a:t>כ"ו/סיון/תשע"ח</a:t>
             </a:fld>
             <a:endParaRPr lang="he-IL"/>
           </a:p>
@@ -2727,7 +2734,7 @@
           <a:p>
             <a:fld id="{8863EACE-5EFD-4C06-816F-033332C7E367}" type="datetimeFigureOut">
               <a:rPr lang="he-IL" smtClean="0"/>
-              <a:t>כ"א/סיון/תשע"ח</a:t>
+              <a:t>כ"ו/סיון/תשע"ח</a:t>
             </a:fld>
             <a:endParaRPr lang="he-IL"/>
           </a:p>
@@ -3102,9 +3109,168 @@
           <a:chExt cx="0" cy="0"/>
         </a:xfrm>
       </p:grpSpPr>
+      <p:grpSp>
+        <p:nvGrpSpPr>
+          <p:cNvPr id="3" name="קבוצה 2"/>
+          <p:cNvGrpSpPr/>
+          <p:nvPr/>
+        </p:nvGrpSpPr>
+        <p:grpSpPr>
+          <a:xfrm>
+            <a:off x="1045844" y="1387580"/>
+            <a:ext cx="9338311" cy="3726182"/>
+            <a:chOff x="1045844" y="1387580"/>
+            <a:chExt cx="9338311" cy="3726182"/>
+          </a:xfrm>
+        </p:grpSpPr>
+        <p:pic>
+          <p:nvPicPr>
+            <p:cNvPr id="1028" name="Picture 4"/>
+            <p:cNvPicPr>
+              <a:picLocks noChangeAspect="1" noChangeArrowheads="1"/>
+            </p:cNvPicPr>
+            <p:nvPr/>
+          </p:nvPicPr>
+          <p:blipFill rotWithShape="1">
+            <a:blip r:embed="rId2">
+              <a:extLst>
+                <a:ext uri="{28A0092B-C50C-407E-A947-70E740481C1C}">
+                  <a14:useLocalDpi xmlns:a14="http://schemas.microsoft.com/office/drawing/2010/main" val="0"/>
+                </a:ext>
+              </a:extLst>
+            </a:blip>
+            <a:srcRect l="5329" t="5092" r="7139" b="1616"/>
+            <a:stretch/>
+          </p:blipFill>
+          <p:spPr bwMode="auto">
+            <a:xfrm>
+              <a:off x="5720714" y="1387581"/>
+              <a:ext cx="4663441" cy="3726181"/>
+            </a:xfrm>
+            <a:prstGeom prst="rect">
+              <a:avLst/>
+            </a:prstGeom>
+            <a:noFill/>
+            <a:ln w="3175">
+              <a:solidFill>
+                <a:schemeClr val="tx1"/>
+              </a:solidFill>
+              <a:miter lim="800000"/>
+              <a:headEnd/>
+              <a:tailEnd/>
+            </a:ln>
+            <a:effectLst/>
+            <a:extLst>
+              <a:ext uri="{909E8E84-426E-40DD-AFC4-6F175D3DCCD1}">
+                <a14:hiddenFill xmlns:a14="http://schemas.microsoft.com/office/drawing/2010/main">
+                  <a:solidFill>
+                    <a:schemeClr val="accent1"/>
+                  </a:solidFill>
+                </a14:hiddenFill>
+              </a:ext>
+              <a:ext uri="{AF507438-7753-43E0-B8FC-AC1667EBCBE1}">
+                <a14:hiddenEffects xmlns:a14="http://schemas.microsoft.com/office/drawing/2010/main">
+                  <a:effectLst>
+                    <a:outerShdw dist="35921" dir="2700000" algn="ctr" rotWithShape="0">
+                      <a:schemeClr val="bg2"/>
+                    </a:outerShdw>
+                  </a:effectLst>
+                </a14:hiddenEffects>
+              </a:ext>
+            </a:extLst>
+          </p:spPr>
+        </p:pic>
+        <p:pic>
+          <p:nvPicPr>
+            <p:cNvPr id="1029" name="Picture 5"/>
+            <p:cNvPicPr>
+              <a:picLocks noChangeAspect="1" noChangeArrowheads="1"/>
+            </p:cNvPicPr>
+            <p:nvPr/>
+          </p:nvPicPr>
+          <p:blipFill rotWithShape="1">
+            <a:blip r:embed="rId3">
+              <a:extLst>
+                <a:ext uri="{28A0092B-C50C-407E-A947-70E740481C1C}">
+                  <a14:useLocalDpi xmlns:a14="http://schemas.microsoft.com/office/drawing/2010/main" val="0"/>
+                </a:ext>
+              </a:extLst>
+            </a:blip>
+            <a:srcRect l="5439" t="4863" r="6814" b="1846"/>
+            <a:stretch/>
+          </p:blipFill>
+          <p:spPr bwMode="auto">
+            <a:xfrm>
+              <a:off x="1045844" y="1387580"/>
+              <a:ext cx="4674870" cy="3726181"/>
+            </a:xfrm>
+            <a:prstGeom prst="rect">
+              <a:avLst/>
+            </a:prstGeom>
+            <a:noFill/>
+            <a:ln w="3175">
+              <a:solidFill>
+                <a:schemeClr val="tx1"/>
+              </a:solidFill>
+              <a:miter lim="800000"/>
+              <a:headEnd/>
+              <a:tailEnd/>
+            </a:ln>
+            <a:effectLst/>
+            <a:extLst>
+              <a:ext uri="{909E8E84-426E-40DD-AFC4-6F175D3DCCD1}">
+                <a14:hiddenFill xmlns:a14="http://schemas.microsoft.com/office/drawing/2010/main">
+                  <a:solidFill>
+                    <a:schemeClr val="accent1"/>
+                  </a:solidFill>
+                </a14:hiddenFill>
+              </a:ext>
+              <a:ext uri="{AF507438-7753-43E0-B8FC-AC1667EBCBE1}">
+                <a14:hiddenEffects xmlns:a14="http://schemas.microsoft.com/office/drawing/2010/main">
+                  <a:effectLst>
+                    <a:outerShdw dist="35921" dir="2700000" algn="ctr" rotWithShape="0">
+                      <a:schemeClr val="bg2"/>
+                    </a:outerShdw>
+                  </a:effectLst>
+                </a14:hiddenEffects>
+              </a:ext>
+            </a:extLst>
+          </p:spPr>
+        </p:pic>
+      </p:grpSp>
+    </p:spTree>
+    <p:extLst>
+      <p:ext uri="{BB962C8B-B14F-4D97-AF65-F5344CB8AC3E}">
+        <p14:creationId xmlns:p14="http://schemas.microsoft.com/office/powerpoint/2010/main" val="2200465672"/>
+      </p:ext>
+    </p:extLst>
+  </p:cSld>
+  <p:clrMapOvr>
+    <a:masterClrMapping/>
+  </p:clrMapOvr>
+</p:sld>
+</file>
+
+<file path=ppt/slides/slide10.xml><?xml version="1.0" encoding="utf-8"?>
+<p:sld xmlns:a="http://schemas.openxmlformats.org/drawingml/2006/main" xmlns:r="http://schemas.openxmlformats.org/officeDocument/2006/relationships" xmlns:p="http://schemas.openxmlformats.org/presentationml/2006/main">
+  <p:cSld>
+    <p:spTree>
+      <p:nvGrpSpPr>
+        <p:cNvPr id="1" name=""/>
+        <p:cNvGrpSpPr/>
+        <p:nvPr/>
+      </p:nvGrpSpPr>
+      <p:grpSpPr>
+        <a:xfrm>
+          <a:off x="0" y="0"/>
+          <a:ext cx="0" cy="0"/>
+          <a:chOff x="0" y="0"/>
+          <a:chExt cx="0" cy="0"/>
+        </a:xfrm>
+      </p:grpSpPr>
       <p:pic>
         <p:nvPicPr>
-          <p:cNvPr id="2050" name="Picture 2"/>
+          <p:cNvPr id="4098" name="Picture 2"/>
           <p:cNvPicPr>
             <a:picLocks noChangeAspect="1" noChangeArrowheads="1"/>
           </p:cNvPicPr>
@@ -3118,70 +3284,13 @@
               </a:ext>
             </a:extLst>
           </a:blip>
-          <a:srcRect l="6192" t="5672" r="6276" b="893"/>
+          <a:srcRect l="6915" t="3326" r="8338"/>
           <a:stretch/>
         </p:blipFill>
         <p:spPr bwMode="auto">
           <a:xfrm>
-            <a:off x="5940896" y="1484784"/>
-            <a:ext cx="4663440" cy="3731895"/>
-          </a:xfrm>
-          <a:prstGeom prst="rect">
-            <a:avLst/>
-          </a:prstGeom>
-          <a:noFill/>
-          <a:ln w="3175">
-            <a:solidFill>
-              <a:schemeClr val="tx1"/>
-            </a:solidFill>
-            <a:miter lim="800000"/>
-            <a:headEnd/>
-            <a:tailEnd/>
-          </a:ln>
-          <a:effectLst/>
-          <a:extLst>
-            <a:ext uri="{909E8E84-426E-40DD-AFC4-6F175D3DCCD1}">
-              <a14:hiddenFill xmlns:a14="http://schemas.microsoft.com/office/drawing/2010/main">
-                <a:solidFill>
-                  <a:schemeClr val="accent1"/>
-                </a:solidFill>
-              </a14:hiddenFill>
-            </a:ext>
-            <a:ext uri="{AF507438-7753-43E0-B8FC-AC1667EBCBE1}">
-              <a14:hiddenEffects xmlns:a14="http://schemas.microsoft.com/office/drawing/2010/main">
-                <a:effectLst>
-                  <a:outerShdw dist="35921" dir="2700000" algn="ctr" rotWithShape="0">
-                    <a:schemeClr val="bg2"/>
-                  </a:outerShdw>
-                </a:effectLst>
-              </a14:hiddenEffects>
-            </a:ext>
-          </a:extLst>
-        </p:spPr>
-      </p:pic>
-      <p:pic>
-        <p:nvPicPr>
-          <p:cNvPr id="2051" name="Picture 3"/>
-          <p:cNvPicPr>
-            <a:picLocks noChangeAspect="1" noChangeArrowheads="1"/>
-          </p:cNvPicPr>
-          <p:nvPr/>
-        </p:nvPicPr>
-        <p:blipFill rotWithShape="1">
-          <a:blip r:embed="rId3">
-            <a:extLst>
-              <a:ext uri="{28A0092B-C50C-407E-A947-70E740481C1C}">
-                <a14:useLocalDpi xmlns:a14="http://schemas.microsoft.com/office/drawing/2010/main" val="0"/>
-              </a:ext>
-            </a:extLst>
-          </a:blip>
-          <a:srcRect l="6121" t="5170" r="6669" b="1395"/>
-          <a:stretch/>
-        </p:blipFill>
-        <p:spPr bwMode="auto">
-          <a:xfrm>
-            <a:off x="1290785" y="1484783"/>
-            <a:ext cx="4646296" cy="3731896"/>
+            <a:off x="331470" y="720090"/>
+            <a:ext cx="10327006" cy="5610860"/>
           </a:xfrm>
           <a:prstGeom prst="rect">
             <a:avLst/>
@@ -3219,7 +3328,7 @@
     </p:spTree>
     <p:extLst>
       <p:ext uri="{BB962C8B-B14F-4D97-AF65-F5344CB8AC3E}">
-        <p14:creationId xmlns:p14="http://schemas.microsoft.com/office/powerpoint/2010/main" val="2200465672"/>
+        <p14:creationId xmlns:p14="http://schemas.microsoft.com/office/powerpoint/2010/main" val="3750874765"/>
       </p:ext>
     </p:extLst>
   </p:cSld>
@@ -3230,6 +3339,165 @@
 </file>
 
 <file path=ppt/slides/slide2.xml><?xml version="1.0" encoding="utf-8"?>
+<p:sld xmlns:a="http://schemas.openxmlformats.org/drawingml/2006/main" xmlns:r="http://schemas.openxmlformats.org/officeDocument/2006/relationships" xmlns:p="http://schemas.openxmlformats.org/presentationml/2006/main">
+  <p:cSld>
+    <p:spTree>
+      <p:nvGrpSpPr>
+        <p:cNvPr id="1" name=""/>
+        <p:cNvGrpSpPr/>
+        <p:nvPr/>
+      </p:nvGrpSpPr>
+      <p:grpSpPr>
+        <a:xfrm>
+          <a:off x="0" y="0"/>
+          <a:ext cx="0" cy="0"/>
+          <a:chOff x="0" y="0"/>
+          <a:chExt cx="0" cy="0"/>
+        </a:xfrm>
+      </p:grpSpPr>
+      <p:grpSp>
+        <p:nvGrpSpPr>
+          <p:cNvPr id="2" name="קבוצה 1"/>
+          <p:cNvGrpSpPr/>
+          <p:nvPr/>
+        </p:nvGrpSpPr>
+        <p:grpSpPr>
+          <a:xfrm>
+            <a:off x="1194435" y="1628775"/>
+            <a:ext cx="9269732" cy="3720467"/>
+            <a:chOff x="1194435" y="1628775"/>
+            <a:chExt cx="9269732" cy="3720467"/>
+          </a:xfrm>
+        </p:grpSpPr>
+        <p:pic>
+          <p:nvPicPr>
+            <p:cNvPr id="2050" name="Picture 2"/>
+            <p:cNvPicPr>
+              <a:picLocks noChangeAspect="1" noChangeArrowheads="1"/>
+            </p:cNvPicPr>
+            <p:nvPr/>
+          </p:nvPicPr>
+          <p:blipFill rotWithShape="1">
+            <a:blip r:embed="rId2">
+              <a:extLst>
+                <a:ext uri="{28A0092B-C50C-407E-A947-70E740481C1C}">
+                  <a14:useLocalDpi xmlns:a14="http://schemas.microsoft.com/office/drawing/2010/main" val="0"/>
+                </a:ext>
+              </a:extLst>
+            </a:blip>
+            <a:srcRect l="5779" t="5408" r="7439" b="1444"/>
+            <a:stretch/>
+          </p:blipFill>
+          <p:spPr bwMode="auto">
+            <a:xfrm>
+              <a:off x="5840731" y="1628775"/>
+              <a:ext cx="4623436" cy="3720467"/>
+            </a:xfrm>
+            <a:prstGeom prst="rect">
+              <a:avLst/>
+            </a:prstGeom>
+            <a:noFill/>
+            <a:ln w="3175">
+              <a:solidFill>
+                <a:schemeClr val="tx1"/>
+              </a:solidFill>
+              <a:miter lim="800000"/>
+              <a:headEnd/>
+              <a:tailEnd/>
+            </a:ln>
+            <a:effectLst/>
+            <a:extLst>
+              <a:ext uri="{909E8E84-426E-40DD-AFC4-6F175D3DCCD1}">
+                <a14:hiddenFill xmlns:a14="http://schemas.microsoft.com/office/drawing/2010/main">
+                  <a:solidFill>
+                    <a:schemeClr val="accent1"/>
+                  </a:solidFill>
+                </a14:hiddenFill>
+              </a:ext>
+              <a:ext uri="{AF507438-7753-43E0-B8FC-AC1667EBCBE1}">
+                <a14:hiddenEffects xmlns:a14="http://schemas.microsoft.com/office/drawing/2010/main">
+                  <a:effectLst>
+                    <a:outerShdw dist="35921" dir="2700000" algn="ctr" rotWithShape="0">
+                      <a:schemeClr val="bg2"/>
+                    </a:outerShdw>
+                  </a:effectLst>
+                </a14:hiddenEffects>
+              </a:ext>
+            </a:extLst>
+          </p:spPr>
+        </p:pic>
+        <p:pic>
+          <p:nvPicPr>
+            <p:cNvPr id="2051" name="Picture 3"/>
+            <p:cNvPicPr>
+              <a:picLocks noChangeAspect="1" noChangeArrowheads="1"/>
+            </p:cNvPicPr>
+            <p:nvPr/>
+          </p:nvPicPr>
+          <p:blipFill rotWithShape="1">
+            <a:blip r:embed="rId3">
+              <a:extLst>
+                <a:ext uri="{28A0092B-C50C-407E-A947-70E740481C1C}">
+                  <a14:useLocalDpi xmlns:a14="http://schemas.microsoft.com/office/drawing/2010/main" val="0"/>
+                </a:ext>
+              </a:extLst>
+            </a:blip>
+            <a:srcRect l="5520" t="5172" r="7269" b="1680"/>
+            <a:stretch/>
+          </p:blipFill>
+          <p:spPr bwMode="auto">
+            <a:xfrm>
+              <a:off x="1194435" y="1628775"/>
+              <a:ext cx="4646296" cy="3720466"/>
+            </a:xfrm>
+            <a:prstGeom prst="rect">
+              <a:avLst/>
+            </a:prstGeom>
+            <a:noFill/>
+            <a:ln w="3175">
+              <a:solidFill>
+                <a:schemeClr val="tx1"/>
+              </a:solidFill>
+              <a:miter lim="800000"/>
+              <a:headEnd/>
+              <a:tailEnd/>
+            </a:ln>
+            <a:effectLst/>
+            <a:extLst>
+              <a:ext uri="{909E8E84-426E-40DD-AFC4-6F175D3DCCD1}">
+                <a14:hiddenFill xmlns:a14="http://schemas.microsoft.com/office/drawing/2010/main">
+                  <a:solidFill>
+                    <a:schemeClr val="accent1"/>
+                  </a:solidFill>
+                </a14:hiddenFill>
+              </a:ext>
+              <a:ext uri="{AF507438-7753-43E0-B8FC-AC1667EBCBE1}">
+                <a14:hiddenEffects xmlns:a14="http://schemas.microsoft.com/office/drawing/2010/main">
+                  <a:effectLst>
+                    <a:outerShdw dist="35921" dir="2700000" algn="ctr" rotWithShape="0">
+                      <a:schemeClr val="bg2"/>
+                    </a:outerShdw>
+                  </a:effectLst>
+                </a14:hiddenEffects>
+              </a:ext>
+            </a:extLst>
+          </p:spPr>
+        </p:pic>
+      </p:grpSp>
+    </p:spTree>
+    <p:extLst>
+      <p:ext uri="{BB962C8B-B14F-4D97-AF65-F5344CB8AC3E}">
+        <p14:creationId xmlns:p14="http://schemas.microsoft.com/office/powerpoint/2010/main" val="4070657894"/>
+      </p:ext>
+    </p:extLst>
+  </p:cSld>
+  <p:clrMapOvr>
+    <a:masterClrMapping/>
+  </p:clrMapOvr>
+</p:sld>
+</file>
+
+<file path=ppt/slides/slide3.xml><?xml version="1.0" encoding="utf-8"?>
 <p:sld xmlns:a="http://schemas.openxmlformats.org/drawingml/2006/main" xmlns:r="http://schemas.openxmlformats.org/officeDocument/2006/relationships" xmlns:p="http://schemas.openxmlformats.org/presentationml/2006/main">
   <p:cSld>
     <p:spTree>
@@ -3388,7 +3656,523 @@
 </p:sld>
 </file>
 
-<file path=ppt/slides/slide3.xml><?xml version="1.0" encoding="utf-8"?>
+<file path=ppt/slides/slide4.xml><?xml version="1.0" encoding="utf-8"?>
+<p:sld xmlns:a="http://schemas.openxmlformats.org/drawingml/2006/main" xmlns:r="http://schemas.openxmlformats.org/officeDocument/2006/relationships" xmlns:p="http://schemas.openxmlformats.org/presentationml/2006/main">
+  <p:cSld>
+    <p:spTree>
+      <p:nvGrpSpPr>
+        <p:cNvPr id="1" name=""/>
+        <p:cNvGrpSpPr/>
+        <p:nvPr/>
+      </p:nvGrpSpPr>
+      <p:grpSpPr>
+        <a:xfrm>
+          <a:off x="0" y="0"/>
+          <a:ext cx="0" cy="0"/>
+          <a:chOff x="0" y="0"/>
+          <a:chExt cx="0" cy="0"/>
+        </a:xfrm>
+      </p:grpSpPr>
+      <p:pic>
+        <p:nvPicPr>
+          <p:cNvPr id="4098" name="Picture 2"/>
+          <p:cNvPicPr>
+            <a:picLocks noChangeAspect="1" noChangeArrowheads="1"/>
+          </p:cNvPicPr>
+          <p:nvPr/>
+        </p:nvPicPr>
+        <p:blipFill rotWithShape="1">
+          <a:blip r:embed="rId2">
+            <a:extLst>
+              <a:ext uri="{28A0092B-C50C-407E-A947-70E740481C1C}">
+                <a14:useLocalDpi xmlns:a14="http://schemas.microsoft.com/office/drawing/2010/main" val="0"/>
+              </a:ext>
+            </a:extLst>
+          </a:blip>
+          <a:srcRect l="5840" t="4043" r="6628" b="1379"/>
+          <a:stretch/>
+        </p:blipFill>
+        <p:spPr bwMode="auto">
+          <a:xfrm>
+            <a:off x="5755005" y="1657350"/>
+            <a:ext cx="4663440" cy="3777615"/>
+          </a:xfrm>
+          <a:prstGeom prst="rect">
+            <a:avLst/>
+          </a:prstGeom>
+          <a:noFill/>
+          <a:ln w="3175">
+            <a:solidFill>
+              <a:schemeClr val="tx1"/>
+            </a:solidFill>
+            <a:miter lim="800000"/>
+            <a:headEnd/>
+            <a:tailEnd/>
+          </a:ln>
+          <a:effectLst/>
+          <a:extLst>
+            <a:ext uri="{909E8E84-426E-40DD-AFC4-6F175D3DCCD1}">
+              <a14:hiddenFill xmlns:a14="http://schemas.microsoft.com/office/drawing/2010/main">
+                <a:solidFill>
+                  <a:schemeClr val="accent1"/>
+                </a:solidFill>
+              </a14:hiddenFill>
+            </a:ext>
+            <a:ext uri="{AF507438-7753-43E0-B8FC-AC1667EBCBE1}">
+              <a14:hiddenEffects xmlns:a14="http://schemas.microsoft.com/office/drawing/2010/main">
+                <a:effectLst>
+                  <a:outerShdw dist="35921" dir="2700000" algn="ctr" rotWithShape="0">
+                    <a:schemeClr val="bg2"/>
+                  </a:outerShdw>
+                </a:effectLst>
+              </a14:hiddenEffects>
+            </a:ext>
+          </a:extLst>
+        </p:spPr>
+      </p:pic>
+      <p:pic>
+        <p:nvPicPr>
+          <p:cNvPr id="4099" name="Picture 3"/>
+          <p:cNvPicPr>
+            <a:picLocks noChangeAspect="1" noChangeArrowheads="1"/>
+          </p:cNvPicPr>
+          <p:nvPr/>
+        </p:nvPicPr>
+        <p:blipFill rotWithShape="1">
+          <a:blip r:embed="rId3">
+            <a:extLst>
+              <a:ext uri="{28A0092B-C50C-407E-A947-70E740481C1C}">
+                <a14:useLocalDpi xmlns:a14="http://schemas.microsoft.com/office/drawing/2010/main" val="0"/>
+              </a:ext>
+            </a:extLst>
+          </a:blip>
+          <a:srcRect l="5931" t="3927" r="7180" b="1495"/>
+          <a:stretch/>
+        </p:blipFill>
+        <p:spPr bwMode="auto">
+          <a:xfrm>
+            <a:off x="1125855" y="1657350"/>
+            <a:ext cx="4629150" cy="3777615"/>
+          </a:xfrm>
+          <a:prstGeom prst="rect">
+            <a:avLst/>
+          </a:prstGeom>
+          <a:noFill/>
+          <a:ln w="3175">
+            <a:solidFill>
+              <a:schemeClr val="tx1"/>
+            </a:solidFill>
+            <a:miter lim="800000"/>
+            <a:headEnd/>
+            <a:tailEnd/>
+          </a:ln>
+          <a:effectLst/>
+          <a:extLst>
+            <a:ext uri="{909E8E84-426E-40DD-AFC4-6F175D3DCCD1}">
+              <a14:hiddenFill xmlns:a14="http://schemas.microsoft.com/office/drawing/2010/main">
+                <a:solidFill>
+                  <a:schemeClr val="accent1"/>
+                </a:solidFill>
+              </a14:hiddenFill>
+            </a:ext>
+            <a:ext uri="{AF507438-7753-43E0-B8FC-AC1667EBCBE1}">
+              <a14:hiddenEffects xmlns:a14="http://schemas.microsoft.com/office/drawing/2010/main">
+                <a:effectLst>
+                  <a:outerShdw dist="35921" dir="2700000" algn="ctr" rotWithShape="0">
+                    <a:schemeClr val="bg2"/>
+                  </a:outerShdw>
+                </a:effectLst>
+              </a14:hiddenEffects>
+            </a:ext>
+          </a:extLst>
+        </p:spPr>
+      </p:pic>
+    </p:spTree>
+    <p:extLst>
+      <p:ext uri="{BB962C8B-B14F-4D97-AF65-F5344CB8AC3E}">
+        <p14:creationId xmlns:p14="http://schemas.microsoft.com/office/powerpoint/2010/main" val="646175487"/>
+      </p:ext>
+    </p:extLst>
+  </p:cSld>
+  <p:clrMapOvr>
+    <a:masterClrMapping/>
+  </p:clrMapOvr>
+</p:sld>
+</file>
+
+<file path=ppt/slides/slide5.xml><?xml version="1.0" encoding="utf-8"?>
+<p:sld xmlns:a="http://schemas.openxmlformats.org/drawingml/2006/main" xmlns:r="http://schemas.openxmlformats.org/officeDocument/2006/relationships" xmlns:p="http://schemas.openxmlformats.org/presentationml/2006/main">
+  <p:cSld>
+    <p:spTree>
+      <p:nvGrpSpPr>
+        <p:cNvPr id="1" name=""/>
+        <p:cNvGrpSpPr/>
+        <p:nvPr/>
+      </p:nvGrpSpPr>
+      <p:grpSpPr>
+        <a:xfrm>
+          <a:off x="0" y="0"/>
+          <a:ext cx="0" cy="0"/>
+          <a:chOff x="0" y="0"/>
+          <a:chExt cx="0" cy="0"/>
+        </a:xfrm>
+      </p:grpSpPr>
+      <p:grpSp>
+        <p:nvGrpSpPr>
+          <p:cNvPr id="3" name="קבוצה 2"/>
+          <p:cNvGrpSpPr/>
+          <p:nvPr/>
+        </p:nvGrpSpPr>
+        <p:grpSpPr>
+          <a:xfrm>
+            <a:off x="112665" y="644226"/>
+            <a:ext cx="10689933" cy="5752525"/>
+            <a:chOff x="112665" y="644226"/>
+            <a:chExt cx="10689933" cy="5752525"/>
+          </a:xfrm>
+        </p:grpSpPr>
+        <p:pic>
+          <p:nvPicPr>
+            <p:cNvPr id="1026" name="Picture 2" descr="C:\Users\User\Desktop\gal\Technion\EEG_Project\Paper\figures\example_rotation_2_subj\Riemannian.png"/>
+            <p:cNvPicPr>
+              <a:picLocks noChangeAspect="1" noChangeArrowheads="1"/>
+            </p:cNvPicPr>
+            <p:nvPr/>
+          </p:nvPicPr>
+          <p:blipFill rotWithShape="1">
+            <a:blip r:embed="rId2">
+              <a:extLst>
+                <a:ext uri="{28A0092B-C50C-407E-A947-70E740481C1C}">
+                  <a14:useLocalDpi xmlns:a14="http://schemas.microsoft.com/office/drawing/2010/main" val="0"/>
+                </a:ext>
+              </a:extLst>
+            </a:blip>
+            <a:srcRect l="49830" r="-11"/>
+            <a:stretch/>
+          </p:blipFill>
+          <p:spPr bwMode="auto">
+            <a:xfrm>
+              <a:off x="112666" y="3523380"/>
+              <a:ext cx="3592466" cy="2873371"/>
+            </a:xfrm>
+            <a:prstGeom prst="rect">
+              <a:avLst/>
+            </a:prstGeom>
+            <a:noFill/>
+            <a:ln w="3175">
+              <a:noFill/>
+            </a:ln>
+            <a:extLst>
+              <a:ext uri="{909E8E84-426E-40DD-AFC4-6F175D3DCCD1}">
+                <a14:hiddenFill xmlns:a14="http://schemas.microsoft.com/office/drawing/2010/main">
+                  <a:solidFill>
+                    <a:srgbClr val="FFFFFF"/>
+                  </a:solidFill>
+                </a14:hiddenFill>
+              </a:ext>
+            </a:extLst>
+          </p:spPr>
+        </p:pic>
+        <p:pic>
+          <p:nvPicPr>
+            <p:cNvPr id="1027" name="Picture 3" descr="C:\Users\User\Desktop\gal\Technion\EEG_Project\Paper\figures\example_rotation_2_subj\Riemannian.png"/>
+            <p:cNvPicPr>
+              <a:picLocks noChangeAspect="1" noChangeArrowheads="1"/>
+            </p:cNvPicPr>
+            <p:nvPr/>
+          </p:nvPicPr>
+          <p:blipFill rotWithShape="1">
+            <a:blip r:embed="rId2">
+              <a:extLst>
+                <a:ext uri="{28A0092B-C50C-407E-A947-70E740481C1C}">
+                  <a14:useLocalDpi xmlns:a14="http://schemas.microsoft.com/office/drawing/2010/main" val="0"/>
+                </a:ext>
+              </a:extLst>
+            </a:blip>
+            <a:srcRect r="50000"/>
+            <a:stretch/>
+          </p:blipFill>
+          <p:spPr bwMode="auto">
+            <a:xfrm>
+              <a:off x="112665" y="644226"/>
+              <a:ext cx="3592467" cy="2883757"/>
+            </a:xfrm>
+            <a:prstGeom prst="rect">
+              <a:avLst/>
+            </a:prstGeom>
+            <a:noFill/>
+            <a:ln>
+              <a:noFill/>
+            </a:ln>
+            <a:extLst>
+              <a:ext uri="{909E8E84-426E-40DD-AFC4-6F175D3DCCD1}">
+                <a14:hiddenFill xmlns:a14="http://schemas.microsoft.com/office/drawing/2010/main">
+                  <a:solidFill>
+                    <a:srgbClr val="FFFFFF"/>
+                  </a:solidFill>
+                </a14:hiddenFill>
+              </a:ext>
+            </a:extLst>
+          </p:spPr>
+        </p:pic>
+        <p:pic>
+          <p:nvPicPr>
+            <p:cNvPr id="10" name="Picture 2" descr="C:\Users\User\Desktop\gal\Technion\EEG_Project\Paper\figures\example_rotation_2_subj\PT.png"/>
+            <p:cNvPicPr>
+              <a:picLocks noChangeAspect="1" noChangeArrowheads="1"/>
+            </p:cNvPicPr>
+            <p:nvPr/>
+          </p:nvPicPr>
+          <p:blipFill rotWithShape="1">
+            <a:blip r:embed="rId3">
+              <a:extLst>
+                <a:ext uri="{28A0092B-C50C-407E-A947-70E740481C1C}">
+                  <a14:useLocalDpi xmlns:a14="http://schemas.microsoft.com/office/drawing/2010/main" val="0"/>
+                </a:ext>
+              </a:extLst>
+            </a:blip>
+            <a:srcRect l="50059" r="-2"/>
+            <a:stretch/>
+          </p:blipFill>
+          <p:spPr bwMode="auto">
+            <a:xfrm>
+              <a:off x="3705132" y="3533792"/>
+              <a:ext cx="3559127" cy="2862959"/>
+            </a:xfrm>
+            <a:prstGeom prst="rect">
+              <a:avLst/>
+            </a:prstGeom>
+            <a:noFill/>
+            <a:extLst>
+              <a:ext uri="{909E8E84-426E-40DD-AFC4-6F175D3DCCD1}">
+                <a14:hiddenFill xmlns:a14="http://schemas.microsoft.com/office/drawing/2010/main">
+                  <a:solidFill>
+                    <a:srgbClr val="FFFFFF"/>
+                  </a:solidFill>
+                </a14:hiddenFill>
+              </a:ext>
+            </a:extLst>
+          </p:spPr>
+        </p:pic>
+        <p:pic>
+          <p:nvPicPr>
+            <p:cNvPr id="11" name="Picture 3" descr="C:\Users\User\Desktop\gal\Technion\EEG_Project\Paper\figures\example_rotation_2_subj\PT.png"/>
+            <p:cNvPicPr>
+              <a:picLocks noChangeAspect="1" noChangeArrowheads="1"/>
+            </p:cNvPicPr>
+            <p:nvPr/>
+          </p:nvPicPr>
+          <p:blipFill rotWithShape="1">
+            <a:blip r:embed="rId3">
+              <a:extLst>
+                <a:ext uri="{28A0092B-C50C-407E-A947-70E740481C1C}">
+                  <a14:useLocalDpi xmlns:a14="http://schemas.microsoft.com/office/drawing/2010/main" val="0"/>
+                </a:ext>
+              </a:extLst>
+            </a:blip>
+            <a:srcRect l="1" r="49959"/>
+            <a:stretch/>
+          </p:blipFill>
+          <p:spPr bwMode="auto">
+            <a:xfrm>
+              <a:off x="3705132" y="646168"/>
+              <a:ext cx="3583939" cy="2877212"/>
+            </a:xfrm>
+            <a:prstGeom prst="rect">
+              <a:avLst/>
+            </a:prstGeom>
+            <a:noFill/>
+            <a:extLst>
+              <a:ext uri="{909E8E84-426E-40DD-AFC4-6F175D3DCCD1}">
+                <a14:hiddenFill xmlns:a14="http://schemas.microsoft.com/office/drawing/2010/main">
+                  <a:solidFill>
+                    <a:srgbClr val="FFFFFF"/>
+                  </a:solidFill>
+                </a14:hiddenFill>
+              </a:ext>
+            </a:extLst>
+          </p:spPr>
+        </p:pic>
+        <p:pic>
+          <p:nvPicPr>
+            <p:cNvPr id="12" name="Picture 4" descr="C:\Users\User\Desktop\gal\Technion\EEG_Project\Paper\figures\example_rotation_2_subj\ROT.png"/>
+            <p:cNvPicPr>
+              <a:picLocks noChangeAspect="1" noChangeArrowheads="1"/>
+            </p:cNvPicPr>
+            <p:nvPr/>
+          </p:nvPicPr>
+          <p:blipFill rotWithShape="1">
+            <a:blip r:embed="rId4">
+              <a:extLst>
+                <a:ext uri="{28A0092B-C50C-407E-A947-70E740481C1C}">
+                  <a14:useLocalDpi xmlns:a14="http://schemas.microsoft.com/office/drawing/2010/main" val="0"/>
+                </a:ext>
+              </a:extLst>
+            </a:blip>
+            <a:srcRect l="49785" r="1"/>
+            <a:stretch/>
+          </p:blipFill>
+          <p:spPr bwMode="auto">
+            <a:xfrm>
+              <a:off x="7261057" y="3523380"/>
+              <a:ext cx="3535955" cy="2870052"/>
+            </a:xfrm>
+            <a:prstGeom prst="rect">
+              <a:avLst/>
+            </a:prstGeom>
+            <a:noFill/>
+            <a:extLst>
+              <a:ext uri="{909E8E84-426E-40DD-AFC4-6F175D3DCCD1}">
+                <a14:hiddenFill xmlns:a14="http://schemas.microsoft.com/office/drawing/2010/main">
+                  <a:solidFill>
+                    <a:srgbClr val="FFFFFF"/>
+                  </a:solidFill>
+                </a14:hiddenFill>
+              </a:ext>
+            </a:extLst>
+          </p:spPr>
+        </p:pic>
+        <p:pic>
+          <p:nvPicPr>
+            <p:cNvPr id="13" name="Picture 5" descr="C:\Users\User\Desktop\gal\Technion\EEG_Project\Paper\figures\example_rotation_2_subj\ROT.png"/>
+            <p:cNvPicPr>
+              <a:picLocks noChangeAspect="1" noChangeArrowheads="1"/>
+            </p:cNvPicPr>
+            <p:nvPr/>
+          </p:nvPicPr>
+          <p:blipFill rotWithShape="1">
+            <a:blip r:embed="rId4">
+              <a:extLst>
+                <a:ext uri="{28A0092B-C50C-407E-A947-70E740481C1C}">
+                  <a14:useLocalDpi xmlns:a14="http://schemas.microsoft.com/office/drawing/2010/main" val="0"/>
+                </a:ext>
+              </a:extLst>
+            </a:blip>
+            <a:srcRect r="50000"/>
+            <a:stretch/>
+          </p:blipFill>
+          <p:spPr bwMode="auto">
+            <a:xfrm>
+              <a:off x="7270571" y="644227"/>
+              <a:ext cx="3532027" cy="2879154"/>
+            </a:xfrm>
+            <a:prstGeom prst="rect">
+              <a:avLst/>
+            </a:prstGeom>
+            <a:noFill/>
+            <a:extLst>
+              <a:ext uri="{909E8E84-426E-40DD-AFC4-6F175D3DCCD1}">
+                <a14:hiddenFill xmlns:a14="http://schemas.microsoft.com/office/drawing/2010/main">
+                  <a:solidFill>
+                    <a:srgbClr val="FFFFFF"/>
+                  </a:solidFill>
+                </a14:hiddenFill>
+              </a:ext>
+            </a:extLst>
+          </p:spPr>
+        </p:pic>
+      </p:grpSp>
+    </p:spTree>
+    <p:extLst>
+      <p:ext uri="{BB962C8B-B14F-4D97-AF65-F5344CB8AC3E}">
+        <p14:creationId xmlns:p14="http://schemas.microsoft.com/office/powerpoint/2010/main" val="1510466345"/>
+      </p:ext>
+    </p:extLst>
+  </p:cSld>
+  <p:clrMapOvr>
+    <a:masterClrMapping/>
+  </p:clrMapOvr>
+</p:sld>
+</file>
+
+<file path=ppt/slides/slide6.xml><?xml version="1.0" encoding="utf-8"?>
+<p:sld xmlns:a="http://schemas.openxmlformats.org/drawingml/2006/main" xmlns:r="http://schemas.openxmlformats.org/officeDocument/2006/relationships" xmlns:p="http://schemas.openxmlformats.org/presentationml/2006/main">
+  <p:cSld>
+    <p:spTree>
+      <p:nvGrpSpPr>
+        <p:cNvPr id="1" name=""/>
+        <p:cNvGrpSpPr/>
+        <p:nvPr/>
+      </p:nvGrpSpPr>
+      <p:grpSpPr>
+        <a:xfrm>
+          <a:off x="0" y="0"/>
+          <a:ext cx="0" cy="0"/>
+          <a:chOff x="0" y="0"/>
+          <a:chExt cx="0" cy="0"/>
+        </a:xfrm>
+      </p:grpSpPr>
+      <p:pic>
+        <p:nvPicPr>
+          <p:cNvPr id="2057" name="Picture 9"/>
+          <p:cNvPicPr>
+            <a:picLocks noChangeAspect="1" noChangeArrowheads="1"/>
+          </p:cNvPicPr>
+          <p:nvPr/>
+        </p:nvPicPr>
+        <p:blipFill rotWithShape="1">
+          <a:blip r:embed="rId2">
+            <a:extLst>
+              <a:ext uri="{28A0092B-C50C-407E-A947-70E740481C1C}">
+                <a14:useLocalDpi xmlns:a14="http://schemas.microsoft.com/office/drawing/2010/main" val="0"/>
+              </a:ext>
+            </a:extLst>
+          </a:blip>
+          <a:srcRect l="6751" r="7045"/>
+          <a:stretch/>
+        </p:blipFill>
+        <p:spPr bwMode="auto">
+          <a:xfrm>
+            <a:off x="1543049" y="1431925"/>
+            <a:ext cx="8046721" cy="3994150"/>
+          </a:xfrm>
+          <a:prstGeom prst="rect">
+            <a:avLst/>
+          </a:prstGeom>
+          <a:noFill/>
+          <a:ln w="3175">
+            <a:solidFill>
+              <a:schemeClr val="tx1"/>
+            </a:solidFill>
+            <a:miter lim="800000"/>
+            <a:headEnd/>
+            <a:tailEnd/>
+          </a:ln>
+          <a:effectLst/>
+          <a:extLst>
+            <a:ext uri="{909E8E84-426E-40DD-AFC4-6F175D3DCCD1}">
+              <a14:hiddenFill xmlns:a14="http://schemas.microsoft.com/office/drawing/2010/main">
+                <a:solidFill>
+                  <a:schemeClr val="accent1"/>
+                </a:solidFill>
+              </a14:hiddenFill>
+            </a:ext>
+            <a:ext uri="{AF507438-7753-43E0-B8FC-AC1667EBCBE1}">
+              <a14:hiddenEffects xmlns:a14="http://schemas.microsoft.com/office/drawing/2010/main">
+                <a:effectLst>
+                  <a:outerShdw dist="35921" dir="2700000" algn="ctr" rotWithShape="0">
+                    <a:schemeClr val="bg2"/>
+                  </a:outerShdw>
+                </a:effectLst>
+              </a14:hiddenEffects>
+            </a:ext>
+          </a:extLst>
+        </p:spPr>
+      </p:pic>
+    </p:spTree>
+    <p:extLst>
+      <p:ext uri="{BB962C8B-B14F-4D97-AF65-F5344CB8AC3E}">
+        <p14:creationId xmlns:p14="http://schemas.microsoft.com/office/powerpoint/2010/main" val="3844002201"/>
+      </p:ext>
+    </p:extLst>
+  </p:cSld>
+  <p:clrMapOvr>
+    <a:masterClrMapping/>
+  </p:clrMapOvr>
+</p:sld>
+</file>
+
+<file path=ppt/slides/slide7.xml><?xml version="1.0" encoding="utf-8"?>
 <p:sld xmlns:a="http://schemas.openxmlformats.org/drawingml/2006/main" xmlns:r="http://schemas.openxmlformats.org/officeDocument/2006/relationships" xmlns:p="http://schemas.openxmlformats.org/presentationml/2006/main">
   <p:cSld>
     <p:spTree>
@@ -3413,15 +4197,15 @@
         </p:nvGrpSpPr>
         <p:grpSpPr>
           <a:xfrm>
-            <a:off x="1125855" y="1657350"/>
-            <a:ext cx="9292590" cy="3777615"/>
-            <a:chOff x="1125855" y="1657350"/>
-            <a:chExt cx="9292590" cy="3777615"/>
+            <a:off x="731520" y="1520190"/>
+            <a:ext cx="9337879" cy="3709035"/>
+            <a:chOff x="731520" y="1520190"/>
+            <a:chExt cx="9337879" cy="3709035"/>
           </a:xfrm>
         </p:grpSpPr>
         <p:pic>
           <p:nvPicPr>
-            <p:cNvPr id="4098" name="Picture 2"/>
+            <p:cNvPr id="1026" name="Picture 2"/>
             <p:cNvPicPr>
               <a:picLocks noChangeAspect="1" noChangeArrowheads="1"/>
             </p:cNvPicPr>
@@ -3435,13 +4219,13 @@
                 </a:ext>
               </a:extLst>
             </a:blip>
-            <a:srcRect l="5840" t="4043" r="6628" b="1379"/>
+            <a:srcRect l="5751" t="6208" r="5751" b="930"/>
             <a:stretch/>
           </p:blipFill>
           <p:spPr bwMode="auto">
             <a:xfrm>
-              <a:off x="5755005" y="1657350"/>
-              <a:ext cx="4663440" cy="3777615"/>
+              <a:off x="5354523" y="1520190"/>
+              <a:ext cx="4714876" cy="3709035"/>
             </a:xfrm>
             <a:prstGeom prst="rect">
               <a:avLst/>
@@ -3478,7 +4262,7 @@
         </p:pic>
         <p:pic>
           <p:nvPicPr>
-            <p:cNvPr id="4099" name="Picture 3"/>
+            <p:cNvPr id="1027" name="Picture 3"/>
             <p:cNvPicPr>
               <a:picLocks noChangeAspect="1" noChangeArrowheads="1"/>
             </p:cNvPicPr>
@@ -3492,13 +4276,13 @@
                 </a:ext>
               </a:extLst>
             </a:blip>
-            <a:srcRect l="5931" t="3927" r="7180" b="1495"/>
+            <a:srcRect l="6292" t="5751" r="7140" b="1387"/>
             <a:stretch/>
           </p:blipFill>
           <p:spPr bwMode="auto">
             <a:xfrm>
-              <a:off x="1125855" y="1657350"/>
-              <a:ext cx="4629150" cy="3777615"/>
+              <a:off x="731520" y="1520190"/>
+              <a:ext cx="4612005" cy="3709035"/>
             </a:xfrm>
             <a:prstGeom prst="rect">
               <a:avLst/>
@@ -3537,7 +4321,325 @@
     </p:spTree>
     <p:extLst>
       <p:ext uri="{BB962C8B-B14F-4D97-AF65-F5344CB8AC3E}">
-        <p14:creationId xmlns:p14="http://schemas.microsoft.com/office/powerpoint/2010/main" val="646175487"/>
+        <p14:creationId xmlns:p14="http://schemas.microsoft.com/office/powerpoint/2010/main" val="3079052812"/>
+      </p:ext>
+    </p:extLst>
+  </p:cSld>
+  <p:clrMapOvr>
+    <a:masterClrMapping/>
+  </p:clrMapOvr>
+</p:sld>
+</file>
+
+<file path=ppt/slides/slide8.xml><?xml version="1.0" encoding="utf-8"?>
+<p:sld xmlns:a="http://schemas.openxmlformats.org/drawingml/2006/main" xmlns:r="http://schemas.openxmlformats.org/officeDocument/2006/relationships" xmlns:p="http://schemas.openxmlformats.org/presentationml/2006/main">
+  <p:cSld>
+    <p:spTree>
+      <p:nvGrpSpPr>
+        <p:cNvPr id="1" name=""/>
+        <p:cNvGrpSpPr/>
+        <p:nvPr/>
+      </p:nvGrpSpPr>
+      <p:grpSpPr>
+        <a:xfrm>
+          <a:off x="0" y="0"/>
+          <a:ext cx="0" cy="0"/>
+          <a:chOff x="0" y="0"/>
+          <a:chExt cx="0" cy="0"/>
+        </a:xfrm>
+      </p:grpSpPr>
+      <p:grpSp>
+        <p:nvGrpSpPr>
+          <p:cNvPr id="2" name="קבוצה 1"/>
+          <p:cNvGrpSpPr/>
+          <p:nvPr/>
+        </p:nvGrpSpPr>
+        <p:grpSpPr>
+          <a:xfrm>
+            <a:off x="542925" y="1440177"/>
+            <a:ext cx="9368731" cy="3783333"/>
+            <a:chOff x="542925" y="1440177"/>
+            <a:chExt cx="9368731" cy="3783333"/>
+          </a:xfrm>
+        </p:grpSpPr>
+        <p:pic>
+          <p:nvPicPr>
+            <p:cNvPr id="2050" name="Picture 2"/>
+            <p:cNvPicPr>
+              <a:picLocks noChangeAspect="1" noChangeArrowheads="1"/>
+            </p:cNvPicPr>
+            <p:nvPr/>
+          </p:nvPicPr>
+          <p:blipFill rotWithShape="1">
+            <a:blip r:embed="rId2">
+              <a:extLst>
+                <a:ext uri="{28A0092B-C50C-407E-A947-70E740481C1C}">
+                  <a14:useLocalDpi xmlns:a14="http://schemas.microsoft.com/office/drawing/2010/main" val="0"/>
+                </a:ext>
+              </a:extLst>
+            </a:blip>
+            <a:srcRect l="5456" t="3577" r="6905" b="1702"/>
+            <a:stretch/>
+          </p:blipFill>
+          <p:spPr bwMode="auto">
+            <a:xfrm>
+              <a:off x="542925" y="1440179"/>
+              <a:ext cx="4669156" cy="3783331"/>
+            </a:xfrm>
+            <a:prstGeom prst="rect">
+              <a:avLst/>
+            </a:prstGeom>
+            <a:noFill/>
+            <a:ln w="3175">
+              <a:solidFill>
+                <a:schemeClr val="tx1"/>
+              </a:solidFill>
+              <a:miter lim="800000"/>
+              <a:headEnd/>
+              <a:tailEnd/>
+            </a:ln>
+            <a:effectLst/>
+            <a:extLst>
+              <a:ext uri="{909E8E84-426E-40DD-AFC4-6F175D3DCCD1}">
+                <a14:hiddenFill xmlns:a14="http://schemas.microsoft.com/office/drawing/2010/main">
+                  <a:solidFill>
+                    <a:schemeClr val="accent1"/>
+                  </a:solidFill>
+                </a14:hiddenFill>
+              </a:ext>
+              <a:ext uri="{AF507438-7753-43E0-B8FC-AC1667EBCBE1}">
+                <a14:hiddenEffects xmlns:a14="http://schemas.microsoft.com/office/drawing/2010/main">
+                  <a:effectLst>
+                    <a:outerShdw dist="35921" dir="2700000" algn="ctr" rotWithShape="0">
+                      <a:schemeClr val="bg2"/>
+                    </a:outerShdw>
+                  </a:effectLst>
+                </a14:hiddenEffects>
+              </a:ext>
+            </a:extLst>
+          </p:spPr>
+        </p:pic>
+        <p:pic>
+          <p:nvPicPr>
+            <p:cNvPr id="2051" name="Picture 3"/>
+            <p:cNvPicPr>
+              <a:picLocks noChangeAspect="1" noChangeArrowheads="1"/>
+            </p:cNvPicPr>
+            <p:nvPr/>
+          </p:nvPicPr>
+          <p:blipFill rotWithShape="1">
+            <a:blip r:embed="rId3">
+              <a:extLst>
+                <a:ext uri="{28A0092B-C50C-407E-A947-70E740481C1C}">
+                  <a14:useLocalDpi xmlns:a14="http://schemas.microsoft.com/office/drawing/2010/main" val="0"/>
+                </a:ext>
+              </a:extLst>
+            </a:blip>
+            <a:srcRect l="5393" t="3948" r="6539" b="1329"/>
+            <a:stretch/>
+          </p:blipFill>
+          <p:spPr bwMode="auto">
+            <a:xfrm>
+              <a:off x="5219641" y="1440177"/>
+              <a:ext cx="4692015" cy="3783331"/>
+            </a:xfrm>
+            <a:prstGeom prst="rect">
+              <a:avLst/>
+            </a:prstGeom>
+            <a:noFill/>
+            <a:ln w="3175">
+              <a:solidFill>
+                <a:schemeClr val="tx1"/>
+              </a:solidFill>
+              <a:miter lim="800000"/>
+              <a:headEnd/>
+              <a:tailEnd/>
+            </a:ln>
+            <a:effectLst/>
+            <a:extLst>
+              <a:ext uri="{909E8E84-426E-40DD-AFC4-6F175D3DCCD1}">
+                <a14:hiddenFill xmlns:a14="http://schemas.microsoft.com/office/drawing/2010/main">
+                  <a:solidFill>
+                    <a:schemeClr val="accent1"/>
+                  </a:solidFill>
+                </a14:hiddenFill>
+              </a:ext>
+              <a:ext uri="{AF507438-7753-43E0-B8FC-AC1667EBCBE1}">
+                <a14:hiddenEffects xmlns:a14="http://schemas.microsoft.com/office/drawing/2010/main">
+                  <a:effectLst>
+                    <a:outerShdw dist="35921" dir="2700000" algn="ctr" rotWithShape="0">
+                      <a:schemeClr val="bg2"/>
+                    </a:outerShdw>
+                  </a:effectLst>
+                </a14:hiddenEffects>
+              </a:ext>
+            </a:extLst>
+          </p:spPr>
+        </p:pic>
+      </p:grpSp>
+    </p:spTree>
+    <p:extLst>
+      <p:ext uri="{BB962C8B-B14F-4D97-AF65-F5344CB8AC3E}">
+        <p14:creationId xmlns:p14="http://schemas.microsoft.com/office/powerpoint/2010/main" val="1568657946"/>
+      </p:ext>
+    </p:extLst>
+  </p:cSld>
+  <p:clrMapOvr>
+    <a:masterClrMapping/>
+  </p:clrMapOvr>
+</p:sld>
+</file>
+
+<file path=ppt/slides/slide9.xml><?xml version="1.0" encoding="utf-8"?>
+<p:sld xmlns:a="http://schemas.openxmlformats.org/drawingml/2006/main" xmlns:r="http://schemas.openxmlformats.org/officeDocument/2006/relationships" xmlns:p="http://schemas.openxmlformats.org/presentationml/2006/main">
+  <p:cSld>
+    <p:spTree>
+      <p:nvGrpSpPr>
+        <p:cNvPr id="1" name=""/>
+        <p:cNvGrpSpPr/>
+        <p:nvPr/>
+      </p:nvGrpSpPr>
+      <p:grpSpPr>
+        <a:xfrm>
+          <a:off x="0" y="0"/>
+          <a:ext cx="0" cy="0"/>
+          <a:chOff x="0" y="0"/>
+          <a:chExt cx="0" cy="0"/>
+        </a:xfrm>
+      </p:grpSpPr>
+      <p:grpSp>
+        <p:nvGrpSpPr>
+          <p:cNvPr id="2" name="קבוצה 1"/>
+          <p:cNvGrpSpPr/>
+          <p:nvPr/>
+        </p:nvGrpSpPr>
+        <p:grpSpPr>
+          <a:xfrm>
+            <a:off x="457200" y="1457323"/>
+            <a:ext cx="9377879" cy="3805587"/>
+            <a:chOff x="457200" y="1457323"/>
+            <a:chExt cx="9377879" cy="3805587"/>
+          </a:xfrm>
+        </p:grpSpPr>
+        <p:pic>
+          <p:nvPicPr>
+            <p:cNvPr id="3074" name="Picture 2"/>
+            <p:cNvPicPr>
+              <a:picLocks noChangeAspect="1" noChangeArrowheads="1"/>
+            </p:cNvPicPr>
+            <p:nvPr/>
+          </p:nvPicPr>
+          <p:blipFill rotWithShape="1">
+            <a:blip r:embed="rId2">
+              <a:extLst>
+                <a:ext uri="{28A0092B-C50C-407E-A947-70E740481C1C}">
+                  <a14:useLocalDpi xmlns:a14="http://schemas.microsoft.com/office/drawing/2010/main" val="0"/>
+                </a:ext>
+              </a:extLst>
+            </a:blip>
+            <a:srcRect l="5751" t="4721" r="6394"/>
+            <a:stretch/>
+          </p:blipFill>
+          <p:spPr bwMode="auto">
+            <a:xfrm>
+              <a:off x="5154493" y="1457323"/>
+              <a:ext cx="4680586" cy="3805585"/>
+            </a:xfrm>
+            <a:prstGeom prst="rect">
+              <a:avLst/>
+            </a:prstGeom>
+            <a:noFill/>
+            <a:ln w="3175">
+              <a:solidFill>
+                <a:schemeClr val="tx1"/>
+              </a:solidFill>
+              <a:miter lim="800000"/>
+              <a:headEnd/>
+              <a:tailEnd/>
+            </a:ln>
+            <a:effectLst/>
+            <a:extLst>
+              <a:ext uri="{909E8E84-426E-40DD-AFC4-6F175D3DCCD1}">
+                <a14:hiddenFill xmlns:a14="http://schemas.microsoft.com/office/drawing/2010/main">
+                  <a:solidFill>
+                    <a:schemeClr val="accent1"/>
+                  </a:solidFill>
+                </a14:hiddenFill>
+              </a:ext>
+              <a:ext uri="{AF507438-7753-43E0-B8FC-AC1667EBCBE1}">
+                <a14:hiddenEffects xmlns:a14="http://schemas.microsoft.com/office/drawing/2010/main">
+                  <a:effectLst>
+                    <a:outerShdw dist="35921" dir="2700000" algn="ctr" rotWithShape="0">
+                      <a:schemeClr val="bg2"/>
+                    </a:outerShdw>
+                  </a:effectLst>
+                </a14:hiddenEffects>
+              </a:ext>
+            </a:extLst>
+          </p:spPr>
+        </p:pic>
+        <p:pic>
+          <p:nvPicPr>
+            <p:cNvPr id="3075" name="Picture 3"/>
+            <p:cNvPicPr>
+              <a:picLocks noChangeAspect="1" noChangeArrowheads="1"/>
+            </p:cNvPicPr>
+            <p:nvPr/>
+          </p:nvPicPr>
+          <p:blipFill rotWithShape="1">
+            <a:blip r:embed="rId3">
+              <a:extLst>
+                <a:ext uri="{28A0092B-C50C-407E-A947-70E740481C1C}">
+                  <a14:useLocalDpi xmlns:a14="http://schemas.microsoft.com/office/drawing/2010/main" val="0"/>
+                </a:ext>
+              </a:extLst>
+            </a:blip>
+            <a:srcRect l="5199" t="4178" r="6947" b="544"/>
+            <a:stretch/>
+          </p:blipFill>
+          <p:spPr bwMode="auto">
+            <a:xfrm>
+              <a:off x="457200" y="1457325"/>
+              <a:ext cx="4680585" cy="3805585"/>
+            </a:xfrm>
+            <a:prstGeom prst="rect">
+              <a:avLst/>
+            </a:prstGeom>
+            <a:noFill/>
+            <a:ln w="3175">
+              <a:solidFill>
+                <a:schemeClr val="tx1"/>
+              </a:solidFill>
+              <a:miter lim="800000"/>
+              <a:headEnd/>
+              <a:tailEnd/>
+            </a:ln>
+            <a:effectLst/>
+            <a:extLst>
+              <a:ext uri="{909E8E84-426E-40DD-AFC4-6F175D3DCCD1}">
+                <a14:hiddenFill xmlns:a14="http://schemas.microsoft.com/office/drawing/2010/main">
+                  <a:solidFill>
+                    <a:schemeClr val="accent1"/>
+                  </a:solidFill>
+                </a14:hiddenFill>
+              </a:ext>
+              <a:ext uri="{AF507438-7753-43E0-B8FC-AC1667EBCBE1}">
+                <a14:hiddenEffects xmlns:a14="http://schemas.microsoft.com/office/drawing/2010/main">
+                  <a:effectLst>
+                    <a:outerShdw dist="35921" dir="2700000" algn="ctr" rotWithShape="0">
+                      <a:schemeClr val="bg2"/>
+                    </a:outerShdw>
+                  </a:effectLst>
+                </a14:hiddenEffects>
+              </a:ext>
+            </a:extLst>
+          </p:spPr>
+        </p:pic>
+      </p:grpSp>
+    </p:spTree>
+    <p:extLst>
+      <p:ext uri="{BB962C8B-B14F-4D97-AF65-F5344CB8AC3E}">
+        <p14:creationId xmlns:p14="http://schemas.microsoft.com/office/powerpoint/2010/main" val="1821712854"/>
       </p:ext>
     </p:extLst>
   </p:cSld>

</xml_diff>